<commit_message>
added some graphs to power point describing what happens when mass of damper changes
</commit_message>
<xml_diff>
--- a/Presentation.pptx
+++ b/Presentation.pptx
@@ -16,12 +16,14 @@
     <p:sldId id="270" r:id="rId10"/>
     <p:sldId id="271" r:id="rId11"/>
     <p:sldId id="272" r:id="rId12"/>
-    <p:sldId id="261" r:id="rId13"/>
-    <p:sldId id="262" r:id="rId14"/>
-    <p:sldId id="268" r:id="rId15"/>
-    <p:sldId id="269" r:id="rId16"/>
-    <p:sldId id="265" r:id="rId17"/>
-    <p:sldId id="266" r:id="rId18"/>
+    <p:sldId id="274" r:id="rId13"/>
+    <p:sldId id="273" r:id="rId14"/>
+    <p:sldId id="261" r:id="rId15"/>
+    <p:sldId id="262" r:id="rId16"/>
+    <p:sldId id="268" r:id="rId17"/>
+    <p:sldId id="269" r:id="rId18"/>
+    <p:sldId id="265" r:id="rId19"/>
+    <p:sldId id="266" r:id="rId20"/>
   </p:sldIdLst>
   <p:sldSz cx="12192000" cy="6858000"/>
   <p:notesSz cx="6858000" cy="9144000"/>
@@ -259,7 +261,7 @@
           <a:p>
             <a:fld id="{AF544164-EB56-4B67-9228-0FE8059D2D21}" type="datetimeFigureOut">
               <a:rPr lang="en-GB" smtClean="0"/>
-              <a:t>29/10/2016</a:t>
+              <a:t>30/10/2016</a:t>
             </a:fld>
             <a:endParaRPr lang="en-GB"/>
           </a:p>
@@ -429,7 +431,7 @@
           <a:p>
             <a:fld id="{AF544164-EB56-4B67-9228-0FE8059D2D21}" type="datetimeFigureOut">
               <a:rPr lang="en-GB" smtClean="0"/>
-              <a:t>29/10/2016</a:t>
+              <a:t>30/10/2016</a:t>
             </a:fld>
             <a:endParaRPr lang="en-GB"/>
           </a:p>
@@ -609,7 +611,7 @@
           <a:p>
             <a:fld id="{AF544164-EB56-4B67-9228-0FE8059D2D21}" type="datetimeFigureOut">
               <a:rPr lang="en-GB" smtClean="0"/>
-              <a:t>29/10/2016</a:t>
+              <a:t>30/10/2016</a:t>
             </a:fld>
             <a:endParaRPr lang="en-GB"/>
           </a:p>
@@ -779,7 +781,7 @@
           <a:p>
             <a:fld id="{AF544164-EB56-4B67-9228-0FE8059D2D21}" type="datetimeFigureOut">
               <a:rPr lang="en-GB" smtClean="0"/>
-              <a:t>29/10/2016</a:t>
+              <a:t>30/10/2016</a:t>
             </a:fld>
             <a:endParaRPr lang="en-GB"/>
           </a:p>
@@ -1025,7 +1027,7 @@
           <a:p>
             <a:fld id="{AF544164-EB56-4B67-9228-0FE8059D2D21}" type="datetimeFigureOut">
               <a:rPr lang="en-GB" smtClean="0"/>
-              <a:t>29/10/2016</a:t>
+              <a:t>30/10/2016</a:t>
             </a:fld>
             <a:endParaRPr lang="en-GB"/>
           </a:p>
@@ -1257,7 +1259,7 @@
           <a:p>
             <a:fld id="{AF544164-EB56-4B67-9228-0FE8059D2D21}" type="datetimeFigureOut">
               <a:rPr lang="en-GB" smtClean="0"/>
-              <a:t>29/10/2016</a:t>
+              <a:t>30/10/2016</a:t>
             </a:fld>
             <a:endParaRPr lang="en-GB"/>
           </a:p>
@@ -1624,7 +1626,7 @@
           <a:p>
             <a:fld id="{AF544164-EB56-4B67-9228-0FE8059D2D21}" type="datetimeFigureOut">
               <a:rPr lang="en-GB" smtClean="0"/>
-              <a:t>29/10/2016</a:t>
+              <a:t>30/10/2016</a:t>
             </a:fld>
             <a:endParaRPr lang="en-GB"/>
           </a:p>
@@ -1742,7 +1744,7 @@
           <a:p>
             <a:fld id="{AF544164-EB56-4B67-9228-0FE8059D2D21}" type="datetimeFigureOut">
               <a:rPr lang="en-GB" smtClean="0"/>
-              <a:t>29/10/2016</a:t>
+              <a:t>30/10/2016</a:t>
             </a:fld>
             <a:endParaRPr lang="en-GB"/>
           </a:p>
@@ -1837,7 +1839,7 @@
           <a:p>
             <a:fld id="{AF544164-EB56-4B67-9228-0FE8059D2D21}" type="datetimeFigureOut">
               <a:rPr lang="en-GB" smtClean="0"/>
-              <a:t>29/10/2016</a:t>
+              <a:t>30/10/2016</a:t>
             </a:fld>
             <a:endParaRPr lang="en-GB"/>
           </a:p>
@@ -2114,7 +2116,7 @@
           <a:p>
             <a:fld id="{AF544164-EB56-4B67-9228-0FE8059D2D21}" type="datetimeFigureOut">
               <a:rPr lang="en-GB" smtClean="0"/>
-              <a:t>29/10/2016</a:t>
+              <a:t>30/10/2016</a:t>
             </a:fld>
             <a:endParaRPr lang="en-GB"/>
           </a:p>
@@ -2367,7 +2369,7 @@
           <a:p>
             <a:fld id="{AF544164-EB56-4B67-9228-0FE8059D2D21}" type="datetimeFigureOut">
               <a:rPr lang="en-GB" smtClean="0"/>
-              <a:t>29/10/2016</a:t>
+              <a:t>30/10/2016</a:t>
             </a:fld>
             <a:endParaRPr lang="en-GB"/>
           </a:p>
@@ -2580,7 +2582,7 @@
           <a:p>
             <a:fld id="{AF544164-EB56-4B67-9228-0FE8059D2D21}" type="datetimeFigureOut">
               <a:rPr lang="en-GB" smtClean="0"/>
-              <a:t>29/10/2016</a:t>
+              <a:t>30/10/2016</a:t>
             </a:fld>
             <a:endParaRPr lang="en-GB"/>
           </a:p>
@@ -3102,8 +3104,8 @@
         </p:blipFill>
         <p:spPr>
           <a:xfrm>
-            <a:off x="2520156" y="1690688"/>
-            <a:ext cx="7151688" cy="4351338"/>
+            <a:off x="3195108" y="1690688"/>
+            <a:ext cx="5801783" cy="4351338"/>
           </a:xfrm>
         </p:spPr>
       </p:pic>
@@ -3183,8 +3185,8 @@
         </p:blipFill>
         <p:spPr>
           <a:xfrm>
-            <a:off x="2520156" y="1690688"/>
-            <a:ext cx="7151688" cy="4351338"/>
+            <a:off x="3195108" y="1690688"/>
+            <a:ext cx="5801783" cy="4351338"/>
           </a:xfrm>
         </p:spPr>
       </p:pic>
@@ -3235,34 +3237,44 @@
           <a:p>
             <a:r>
               <a:rPr lang="en-GB" dirty="0"/>
-              <a:t>Conclusions</a:t>
-            </a:r>
-          </a:p>
-        </p:txBody>
-      </p:sp>
-      <p:sp>
-        <p:nvSpPr>
-          <p:cNvPr id="3" name="Content Placeholder 2"/>
-          <p:cNvSpPr>
-            <a:spLocks noGrp="1"/>
-          </p:cNvSpPr>
+              <a:t>Graphs for floor 1: varying absorber mass from 0.05kg to 0.2kg</a:t>
+            </a:r>
+          </a:p>
+        </p:txBody>
+      </p:sp>
+      <p:pic>
+        <p:nvPicPr>
+          <p:cNvPr id="10" name="Content Placeholder 9"/>
+          <p:cNvPicPr>
+            <a:picLocks noGrp="1" noChangeAspect="1"/>
+          </p:cNvPicPr>
           <p:nvPr>
             <p:ph idx="1"/>
           </p:nvPr>
-        </p:nvSpPr>
-        <p:spPr/>
-        <p:txBody>
-          <a:bodyPr/>
-          <a:lstStyle/>
-          <a:p>
-            <a:endParaRPr lang="en-GB"/>
-          </a:p>
-        </p:txBody>
-      </p:sp>
+        </p:nvPicPr>
+        <p:blipFill>
+          <a:blip r:embed="rId2">
+            <a:extLst>
+              <a:ext uri="{28A0092B-C50C-407E-A947-70E740481C1C}">
+                <a14:useLocalDpi xmlns:a14="http://schemas.microsoft.com/office/drawing/2010/main" val="0"/>
+              </a:ext>
+            </a:extLst>
+          </a:blip>
+          <a:stretch>
+            <a:fillRect/>
+          </a:stretch>
+        </p:blipFill>
+        <p:spPr>
+          <a:xfrm>
+            <a:off x="3195108" y="1690688"/>
+            <a:ext cx="5801783" cy="4351337"/>
+          </a:xfrm>
+        </p:spPr>
+      </p:pic>
     </p:spTree>
     <p:extLst>
       <p:ext uri="{BB962C8B-B14F-4D97-AF65-F5344CB8AC3E}">
-        <p14:creationId xmlns:p14="http://schemas.microsoft.com/office/powerpoint/2010/main" val="4233122878"/>
+        <p14:creationId xmlns:p14="http://schemas.microsoft.com/office/powerpoint/2010/main" val="3965699234"/>
       </p:ext>
     </p:extLst>
   </p:cSld>
@@ -3301,6 +3313,164 @@
         </p:nvSpPr>
         <p:spPr/>
         <p:txBody>
+          <a:bodyPr>
+            <a:normAutofit fontScale="90000"/>
+          </a:bodyPr>
+          <a:lstStyle/>
+          <a:p>
+            <a:r>
+              <a:rPr lang="en-GB" dirty="0" smtClean="0"/>
+              <a:t>Effect of choice of absorber mass on amplitude at resonance and on optimal damping of absorber.</a:t>
+            </a:r>
+            <a:endParaRPr lang="en-GB" dirty="0"/>
+          </a:p>
+        </p:txBody>
+      </p:sp>
+      <p:pic>
+        <p:nvPicPr>
+          <p:cNvPr id="4" name="Content Placeholder 3"/>
+          <p:cNvPicPr>
+            <a:picLocks noGrp="1" noChangeAspect="1"/>
+          </p:cNvPicPr>
+          <p:nvPr>
+            <p:ph idx="1"/>
+          </p:nvPr>
+        </p:nvPicPr>
+        <p:blipFill>
+          <a:blip r:embed="rId2">
+            <a:extLst>
+              <a:ext uri="{28A0092B-C50C-407E-A947-70E740481C1C}">
+                <a14:useLocalDpi xmlns:a14="http://schemas.microsoft.com/office/drawing/2010/main" val="0"/>
+              </a:ext>
+            </a:extLst>
+          </a:blip>
+          <a:stretch>
+            <a:fillRect/>
+          </a:stretch>
+        </p:blipFill>
+        <p:spPr>
+          <a:xfrm>
+            <a:off x="2867892" y="1823360"/>
+            <a:ext cx="5903087" cy="4427316"/>
+          </a:xfrm>
+          <a:prstGeom prst="rect">
+            <a:avLst/>
+          </a:prstGeom>
+        </p:spPr>
+      </p:pic>
+    </p:spTree>
+    <p:extLst>
+      <p:ext uri="{BB962C8B-B14F-4D97-AF65-F5344CB8AC3E}">
+        <p14:creationId xmlns:p14="http://schemas.microsoft.com/office/powerpoint/2010/main" val="3873014354"/>
+      </p:ext>
+    </p:extLst>
+  </p:cSld>
+  <p:clrMapOvr>
+    <a:masterClrMapping/>
+  </p:clrMapOvr>
+</p:sld>
+</file>
+
+<file path=ppt/slides/slide14.xml><?xml version="1.0" encoding="utf-8"?>
+<p:sld xmlns:a="http://schemas.openxmlformats.org/drawingml/2006/main" xmlns:r="http://schemas.openxmlformats.org/officeDocument/2006/relationships" xmlns:p="http://schemas.openxmlformats.org/presentationml/2006/main">
+  <p:cSld>
+    <p:spTree>
+      <p:nvGrpSpPr>
+        <p:cNvPr id="1" name=""/>
+        <p:cNvGrpSpPr/>
+        <p:nvPr/>
+      </p:nvGrpSpPr>
+      <p:grpSpPr>
+        <a:xfrm>
+          <a:off x="0" y="0"/>
+          <a:ext cx="0" cy="0"/>
+          <a:chOff x="0" y="0"/>
+          <a:chExt cx="0" cy="0"/>
+        </a:xfrm>
+      </p:grpSpPr>
+      <p:sp>
+        <p:nvSpPr>
+          <p:cNvPr id="2" name="Title 1"/>
+          <p:cNvSpPr>
+            <a:spLocks noGrp="1"/>
+          </p:cNvSpPr>
+          <p:nvPr>
+            <p:ph type="title"/>
+          </p:nvPr>
+        </p:nvSpPr>
+        <p:spPr/>
+        <p:txBody>
+          <a:bodyPr/>
+          <a:lstStyle/>
+          <a:p>
+            <a:r>
+              <a:rPr lang="en-GB" dirty="0"/>
+              <a:t>Conclusions</a:t>
+            </a:r>
+          </a:p>
+        </p:txBody>
+      </p:sp>
+      <p:sp>
+        <p:nvSpPr>
+          <p:cNvPr id="3" name="Content Placeholder 2"/>
+          <p:cNvSpPr>
+            <a:spLocks noGrp="1"/>
+          </p:cNvSpPr>
+          <p:nvPr>
+            <p:ph idx="1"/>
+          </p:nvPr>
+        </p:nvSpPr>
+        <p:spPr/>
+        <p:txBody>
+          <a:bodyPr/>
+          <a:lstStyle/>
+          <a:p>
+            <a:endParaRPr lang="en-GB"/>
+          </a:p>
+        </p:txBody>
+      </p:sp>
+    </p:spTree>
+    <p:extLst>
+      <p:ext uri="{BB962C8B-B14F-4D97-AF65-F5344CB8AC3E}">
+        <p14:creationId xmlns:p14="http://schemas.microsoft.com/office/powerpoint/2010/main" val="4233122878"/>
+      </p:ext>
+    </p:extLst>
+  </p:cSld>
+  <p:clrMapOvr>
+    <a:masterClrMapping/>
+  </p:clrMapOvr>
+</p:sld>
+</file>
+
+<file path=ppt/slides/slide15.xml><?xml version="1.0" encoding="utf-8"?>
+<p:sld xmlns:a="http://schemas.openxmlformats.org/drawingml/2006/main" xmlns:r="http://schemas.openxmlformats.org/officeDocument/2006/relationships" xmlns:p="http://schemas.openxmlformats.org/presentationml/2006/main">
+  <p:cSld>
+    <p:spTree>
+      <p:nvGrpSpPr>
+        <p:cNvPr id="1" name=""/>
+        <p:cNvGrpSpPr/>
+        <p:nvPr/>
+      </p:nvGrpSpPr>
+      <p:grpSpPr>
+        <a:xfrm>
+          <a:off x="0" y="0"/>
+          <a:ext cx="0" cy="0"/>
+          <a:chOff x="0" y="0"/>
+          <a:chExt cx="0" cy="0"/>
+        </a:xfrm>
+      </p:grpSpPr>
+      <p:sp>
+        <p:nvSpPr>
+          <p:cNvPr id="2" name="Title 1"/>
+          <p:cNvSpPr>
+            <a:spLocks noGrp="1"/>
+          </p:cNvSpPr>
+          <p:nvPr>
+            <p:ph type="title"/>
+          </p:nvPr>
+        </p:nvSpPr>
+        <p:spPr/>
+        <p:txBody>
           <a:bodyPr/>
           <a:lstStyle/>
           <a:p>
@@ -3403,7 +3573,7 @@
 </p:sld>
 </file>
 
-<file path=ppt/slides/slide14.xml><?xml version="1.0" encoding="utf-8"?>
+<file path=ppt/slides/slide16.xml><?xml version="1.0" encoding="utf-8"?>
 <p:sld xmlns:a="http://schemas.openxmlformats.org/drawingml/2006/main" xmlns:r="http://schemas.openxmlformats.org/officeDocument/2006/relationships" xmlns:p="http://schemas.openxmlformats.org/presentationml/2006/main">
   <p:cSld>
     <p:spTree>
@@ -4633,7 +4803,7 @@
 </p:sld>
 </file>
 
-<file path=ppt/slides/slide15.xml><?xml version="1.0" encoding="utf-8"?>
+<file path=ppt/slides/slide17.xml><?xml version="1.0" encoding="utf-8"?>
 <p:sld xmlns:a="http://schemas.openxmlformats.org/drawingml/2006/main" xmlns:r="http://schemas.openxmlformats.org/officeDocument/2006/relationships" xmlns:p="http://schemas.openxmlformats.org/presentationml/2006/main">
   <p:cSld>
     <p:spTree>
@@ -5584,7 +5754,7 @@
 </p:sld>
 </file>
 
-<file path=ppt/slides/slide16.xml><?xml version="1.0" encoding="utf-8"?>
+<file path=ppt/slides/slide18.xml><?xml version="1.0" encoding="utf-8"?>
 <p:sld xmlns:a="http://schemas.openxmlformats.org/drawingml/2006/main" xmlns:r="http://schemas.openxmlformats.org/officeDocument/2006/relationships" xmlns:p="http://schemas.openxmlformats.org/presentationml/2006/main">
   <p:cSld>
     <p:spTree>
@@ -5667,7 +5837,7 @@
 </p:sld>
 </file>
 
-<file path=ppt/slides/slide17.xml><?xml version="1.0" encoding="utf-8"?>
+<file path=ppt/slides/slide19.xml><?xml version="1.0" encoding="utf-8"?>
 <p:sld xmlns:a="http://schemas.openxmlformats.org/drawingml/2006/main" xmlns:r="http://schemas.openxmlformats.org/officeDocument/2006/relationships" xmlns:p="http://schemas.openxmlformats.org/presentationml/2006/main">
   <p:cSld>
     <p:spTree>
@@ -6528,8 +6698,8 @@
         </p:blipFill>
         <p:spPr>
           <a:xfrm>
-            <a:off x="2520156" y="1690688"/>
-            <a:ext cx="7151688" cy="4351338"/>
+            <a:off x="3195108" y="1690688"/>
+            <a:ext cx="5801783" cy="4351338"/>
           </a:xfrm>
         </p:spPr>
       </p:pic>

</xml_diff>

<commit_message>
added note about results when absorber = 0.4kg
</commit_message>
<xml_diff>
--- a/Presentation.pptx
+++ b/Presentation.pptx
@@ -18,12 +18,13 @@
     <p:sldId id="272" r:id="rId12"/>
     <p:sldId id="274" r:id="rId13"/>
     <p:sldId id="273" r:id="rId14"/>
-    <p:sldId id="261" r:id="rId15"/>
-    <p:sldId id="262" r:id="rId16"/>
-    <p:sldId id="268" r:id="rId17"/>
-    <p:sldId id="269" r:id="rId18"/>
-    <p:sldId id="265" r:id="rId19"/>
-    <p:sldId id="266" r:id="rId20"/>
+    <p:sldId id="275" r:id="rId15"/>
+    <p:sldId id="261" r:id="rId16"/>
+    <p:sldId id="262" r:id="rId17"/>
+    <p:sldId id="268" r:id="rId18"/>
+    <p:sldId id="269" r:id="rId19"/>
+    <p:sldId id="265" r:id="rId20"/>
+    <p:sldId id="266" r:id="rId21"/>
   </p:sldIdLst>
   <p:sldSz cx="12192000" cy="6858000"/>
   <p:notesSz cx="6858000" cy="9144000"/>
@@ -3390,34 +3391,51 @@
       </p:grpSpPr>
       <p:sp>
         <p:nvSpPr>
-          <p:cNvPr id="2" name="Title 1"/>
+          <p:cNvPr id="3" name="Content Placeholder 2"/>
+          <p:cNvSpPr>
+            <a:spLocks noGrp="1"/>
+          </p:cNvSpPr>
+          <p:nvPr>
+            <p:ph idx="1"/>
+          </p:nvPr>
+        </p:nvSpPr>
+        <p:spPr/>
+        <p:txBody>
+          <a:bodyPr/>
+          <a:lstStyle/>
+          <a:p>
+            <a:r>
+              <a:rPr lang="en-GB" dirty="0"/>
+              <a:t>Note for absorber of mass = 0.4 this is becoming quite close to the equivalent mass of building (3.3kg) so the results produced may not be reliable as mass of absorber will have </a:t>
+            </a:r>
+            <a:r>
+              <a:rPr lang="en-GB" dirty="0" smtClean="0"/>
+              <a:t>substantial </a:t>
+            </a:r>
+            <a:r>
+              <a:rPr lang="en-GB" dirty="0"/>
+              <a:t>affect </a:t>
+            </a:r>
+            <a:r>
+              <a:rPr lang="en-GB"/>
+              <a:t>on </a:t>
+            </a:r>
+            <a:r>
+              <a:rPr lang="en-GB" smtClean="0"/>
+              <a:t>building</a:t>
+            </a:r>
+            <a:endParaRPr lang="en-GB" b="1" dirty="0"/>
+          </a:p>
+        </p:txBody>
+      </p:sp>
+      <p:sp>
+        <p:nvSpPr>
+          <p:cNvPr id="4" name="Title 3"/>
           <p:cNvSpPr>
             <a:spLocks noGrp="1"/>
           </p:cNvSpPr>
           <p:nvPr>
             <p:ph type="title"/>
-          </p:nvPr>
-        </p:nvSpPr>
-        <p:spPr/>
-        <p:txBody>
-          <a:bodyPr/>
-          <a:lstStyle/>
-          <a:p>
-            <a:r>
-              <a:rPr lang="en-GB" dirty="0"/>
-              <a:t>Conclusions</a:t>
-            </a:r>
-          </a:p>
-        </p:txBody>
-      </p:sp>
-      <p:sp>
-        <p:nvSpPr>
-          <p:cNvPr id="3" name="Content Placeholder 2"/>
-          <p:cNvSpPr>
-            <a:spLocks noGrp="1"/>
-          </p:cNvSpPr>
-          <p:nvPr>
-            <p:ph idx="1"/>
           </p:nvPr>
         </p:nvSpPr>
         <p:spPr/>
@@ -3432,7 +3450,7 @@
     </p:spTree>
     <p:extLst>
       <p:ext uri="{BB962C8B-B14F-4D97-AF65-F5344CB8AC3E}">
-        <p14:creationId xmlns:p14="http://schemas.microsoft.com/office/powerpoint/2010/main" val="4233122878"/>
+        <p14:creationId xmlns:p14="http://schemas.microsoft.com/office/powerpoint/2010/main" val="1072918806"/>
       </p:ext>
     </p:extLst>
   </p:cSld>
@@ -3476,6 +3494,77 @@
           <a:p>
             <a:r>
               <a:rPr lang="en-GB" dirty="0"/>
+              <a:t>Conclusions</a:t>
+            </a:r>
+          </a:p>
+        </p:txBody>
+      </p:sp>
+      <p:sp>
+        <p:nvSpPr>
+          <p:cNvPr id="3" name="Content Placeholder 2"/>
+          <p:cNvSpPr>
+            <a:spLocks noGrp="1"/>
+          </p:cNvSpPr>
+          <p:nvPr>
+            <p:ph idx="1"/>
+          </p:nvPr>
+        </p:nvSpPr>
+        <p:spPr/>
+        <p:txBody>
+          <a:bodyPr/>
+          <a:lstStyle/>
+          <a:p>
+            <a:endParaRPr lang="en-GB"/>
+          </a:p>
+        </p:txBody>
+      </p:sp>
+    </p:spTree>
+    <p:extLst>
+      <p:ext uri="{BB962C8B-B14F-4D97-AF65-F5344CB8AC3E}">
+        <p14:creationId xmlns:p14="http://schemas.microsoft.com/office/powerpoint/2010/main" val="4233122878"/>
+      </p:ext>
+    </p:extLst>
+  </p:cSld>
+  <p:clrMapOvr>
+    <a:masterClrMapping/>
+  </p:clrMapOvr>
+</p:sld>
+</file>
+
+<file path=ppt/slides/slide16.xml><?xml version="1.0" encoding="utf-8"?>
+<p:sld xmlns:a="http://schemas.openxmlformats.org/drawingml/2006/main" xmlns:r="http://schemas.openxmlformats.org/officeDocument/2006/relationships" xmlns:p="http://schemas.openxmlformats.org/presentationml/2006/main">
+  <p:cSld>
+    <p:spTree>
+      <p:nvGrpSpPr>
+        <p:cNvPr id="1" name=""/>
+        <p:cNvGrpSpPr/>
+        <p:nvPr/>
+      </p:nvGrpSpPr>
+      <p:grpSpPr>
+        <a:xfrm>
+          <a:off x="0" y="0"/>
+          <a:ext cx="0" cy="0"/>
+          <a:chOff x="0" y="0"/>
+          <a:chExt cx="0" cy="0"/>
+        </a:xfrm>
+      </p:grpSpPr>
+      <p:sp>
+        <p:nvSpPr>
+          <p:cNvPr id="2" name="Title 1"/>
+          <p:cNvSpPr>
+            <a:spLocks noGrp="1"/>
+          </p:cNvSpPr>
+          <p:nvPr>
+            <p:ph type="title"/>
+          </p:nvPr>
+        </p:nvSpPr>
+        <p:spPr/>
+        <p:txBody>
+          <a:bodyPr/>
+          <a:lstStyle/>
+          <a:p>
+            <a:r>
+              <a:rPr lang="en-GB" dirty="0"/>
               <a:t>Further Developments</a:t>
             </a:r>
           </a:p>
@@ -3573,7 +3662,7 @@
 </p:sld>
 </file>
 
-<file path=ppt/slides/slide16.xml><?xml version="1.0" encoding="utf-8"?>
+<file path=ppt/slides/slide17.xml><?xml version="1.0" encoding="utf-8"?>
 <p:sld xmlns:a="http://schemas.openxmlformats.org/drawingml/2006/main" xmlns:r="http://schemas.openxmlformats.org/officeDocument/2006/relationships" xmlns:p="http://schemas.openxmlformats.org/presentationml/2006/main">
   <p:cSld>
     <p:spTree>
@@ -4803,7 +4892,7 @@
 </p:sld>
 </file>
 
-<file path=ppt/slides/slide17.xml><?xml version="1.0" encoding="utf-8"?>
+<file path=ppt/slides/slide18.xml><?xml version="1.0" encoding="utf-8"?>
 <p:sld xmlns:a="http://schemas.openxmlformats.org/drawingml/2006/main" xmlns:r="http://schemas.openxmlformats.org/officeDocument/2006/relationships" xmlns:p="http://schemas.openxmlformats.org/presentationml/2006/main">
   <p:cSld>
     <p:spTree>
@@ -5754,89 +5843,6 @@
 </p:sld>
 </file>
 
-<file path=ppt/slides/slide18.xml><?xml version="1.0" encoding="utf-8"?>
-<p:sld xmlns:a="http://schemas.openxmlformats.org/drawingml/2006/main" xmlns:r="http://schemas.openxmlformats.org/officeDocument/2006/relationships" xmlns:p="http://schemas.openxmlformats.org/presentationml/2006/main">
-  <p:cSld>
-    <p:spTree>
-      <p:nvGrpSpPr>
-        <p:cNvPr id="1" name=""/>
-        <p:cNvGrpSpPr/>
-        <p:nvPr/>
-      </p:nvGrpSpPr>
-      <p:grpSpPr>
-        <a:xfrm>
-          <a:off x="0" y="0"/>
-          <a:ext cx="0" cy="0"/>
-          <a:chOff x="0" y="0"/>
-          <a:chExt cx="0" cy="0"/>
-        </a:xfrm>
-      </p:grpSpPr>
-      <p:sp>
-        <p:nvSpPr>
-          <p:cNvPr id="2" name="Title 1"/>
-          <p:cNvSpPr>
-            <a:spLocks noGrp="1"/>
-          </p:cNvSpPr>
-          <p:nvPr>
-            <p:ph type="title"/>
-          </p:nvPr>
-        </p:nvSpPr>
-        <p:spPr/>
-        <p:txBody>
-          <a:bodyPr/>
-          <a:lstStyle/>
-          <a:p>
-            <a:r>
-              <a:rPr lang="en-GB" dirty="0"/>
-              <a:t>Interesting things noted</a:t>
-            </a:r>
-          </a:p>
-        </p:txBody>
-      </p:sp>
-      <p:sp>
-        <p:nvSpPr>
-          <p:cNvPr id="3" name="Content Placeholder 2"/>
-          <p:cNvSpPr>
-            <a:spLocks noGrp="1"/>
-          </p:cNvSpPr>
-          <p:nvPr>
-            <p:ph idx="1"/>
-          </p:nvPr>
-        </p:nvSpPr>
-        <p:spPr/>
-        <p:txBody>
-          <a:bodyPr/>
-          <a:lstStyle/>
-          <a:p>
-            <a:r>
-              <a:rPr lang="en-GB" dirty="0"/>
-              <a:t>Equivalent mass matrix is symmetric about major diagonal (with top floor, first mode in top left)</a:t>
-            </a:r>
-          </a:p>
-          <a:p>
-            <a:r>
-              <a:rPr lang="en-GB" dirty="0"/>
-              <a:t>Results of plotting 3d graph of frequency, absorber damping and amplitude not clear, plotting on log scales gives much clearer results and obvious saddle point, this is what we are aiming for with the optimum damper.</a:t>
-            </a:r>
-          </a:p>
-          <a:p>
-            <a:endParaRPr lang="en-GB" dirty="0"/>
-          </a:p>
-        </p:txBody>
-      </p:sp>
-    </p:spTree>
-    <p:extLst>
-      <p:ext uri="{BB962C8B-B14F-4D97-AF65-F5344CB8AC3E}">
-        <p14:creationId xmlns:p14="http://schemas.microsoft.com/office/powerpoint/2010/main" val="906454031"/>
-      </p:ext>
-    </p:extLst>
-  </p:cSld>
-  <p:clrMapOvr>
-    <a:masterClrMapping/>
-  </p:clrMapOvr>
-</p:sld>
-</file>
-
 <file path=ppt/slides/slide19.xml><?xml version="1.0" encoding="utf-8"?>
 <p:sld xmlns:a="http://schemas.openxmlformats.org/drawingml/2006/main" xmlns:r="http://schemas.openxmlformats.org/officeDocument/2006/relationships" xmlns:p="http://schemas.openxmlformats.org/presentationml/2006/main">
   <p:cSld>
@@ -5871,7 +5877,7 @@
           <a:p>
             <a:r>
               <a:rPr lang="en-GB" dirty="0"/>
-              <a:t>Sanity Checks</a:t>
+              <a:t>Interesting things noted</a:t>
             </a:r>
           </a:p>
         </p:txBody>
@@ -5893,33 +5899,13 @@
           <a:p>
             <a:r>
               <a:rPr lang="en-GB" dirty="0"/>
-              <a:t>After modelling approximations, checked that the response with:</a:t>
+              <a:t>Equivalent mass matrix is symmetric about major diagonal (with top floor, first mode in top left)</a:t>
             </a:r>
           </a:p>
           <a:p>
             <a:r>
               <a:rPr lang="en-GB" dirty="0"/>
-              <a:t>Absorber damping of 0 = two split peaks about resonant frequency</a:t>
-            </a:r>
-          </a:p>
-          <a:p>
-            <a:r>
-              <a:rPr lang="en-GB" dirty="0"/>
-              <a:t>Absorber damping high = small </a:t>
-            </a:r>
-            <a:r>
-              <a:rPr lang="en-GB" dirty="0" err="1"/>
-              <a:t>dm</a:t>
-            </a:r>
-            <a:r>
-              <a:rPr lang="en-GB" dirty="0"/>
-              <a:t> to system so slight change in resonant frequency but single peak (effectively 1dof system)</a:t>
-            </a:r>
-          </a:p>
-          <a:p>
-            <a:r>
-              <a:rPr lang="en-GB" dirty="0"/>
-              <a:t>Plot graph of maximum amplitude for each absorber damping to check expected result.</a:t>
+              <a:t>Results of plotting 3d graph of frequency, absorber damping and amplitude not clear, plotting on log scales gives much clearer results and obvious saddle point, this is what we are aiming for with the optimum damper.</a:t>
             </a:r>
           </a:p>
           <a:p>
@@ -5930,7 +5916,7 @@
     </p:spTree>
     <p:extLst>
       <p:ext uri="{BB962C8B-B14F-4D97-AF65-F5344CB8AC3E}">
-        <p14:creationId xmlns:p14="http://schemas.microsoft.com/office/powerpoint/2010/main" val="2037780352"/>
+        <p14:creationId xmlns:p14="http://schemas.microsoft.com/office/powerpoint/2010/main" val="906454031"/>
       </p:ext>
     </p:extLst>
   </p:cSld>
@@ -6017,6 +6003,109 @@
     <p:extLst>
       <p:ext uri="{BB962C8B-B14F-4D97-AF65-F5344CB8AC3E}">
         <p14:creationId xmlns:p14="http://schemas.microsoft.com/office/powerpoint/2010/main" val="2509787941"/>
+      </p:ext>
+    </p:extLst>
+  </p:cSld>
+  <p:clrMapOvr>
+    <a:masterClrMapping/>
+  </p:clrMapOvr>
+</p:sld>
+</file>
+
+<file path=ppt/slides/slide20.xml><?xml version="1.0" encoding="utf-8"?>
+<p:sld xmlns:a="http://schemas.openxmlformats.org/drawingml/2006/main" xmlns:r="http://schemas.openxmlformats.org/officeDocument/2006/relationships" xmlns:p="http://schemas.openxmlformats.org/presentationml/2006/main">
+  <p:cSld>
+    <p:spTree>
+      <p:nvGrpSpPr>
+        <p:cNvPr id="1" name=""/>
+        <p:cNvGrpSpPr/>
+        <p:nvPr/>
+      </p:nvGrpSpPr>
+      <p:grpSpPr>
+        <a:xfrm>
+          <a:off x="0" y="0"/>
+          <a:ext cx="0" cy="0"/>
+          <a:chOff x="0" y="0"/>
+          <a:chExt cx="0" cy="0"/>
+        </a:xfrm>
+      </p:grpSpPr>
+      <p:sp>
+        <p:nvSpPr>
+          <p:cNvPr id="2" name="Title 1"/>
+          <p:cNvSpPr>
+            <a:spLocks noGrp="1"/>
+          </p:cNvSpPr>
+          <p:nvPr>
+            <p:ph type="title"/>
+          </p:nvPr>
+        </p:nvSpPr>
+        <p:spPr/>
+        <p:txBody>
+          <a:bodyPr/>
+          <a:lstStyle/>
+          <a:p>
+            <a:r>
+              <a:rPr lang="en-GB" dirty="0"/>
+              <a:t>Sanity Checks</a:t>
+            </a:r>
+          </a:p>
+        </p:txBody>
+      </p:sp>
+      <p:sp>
+        <p:nvSpPr>
+          <p:cNvPr id="3" name="Content Placeholder 2"/>
+          <p:cNvSpPr>
+            <a:spLocks noGrp="1"/>
+          </p:cNvSpPr>
+          <p:nvPr>
+            <p:ph idx="1"/>
+          </p:nvPr>
+        </p:nvSpPr>
+        <p:spPr/>
+        <p:txBody>
+          <a:bodyPr/>
+          <a:lstStyle/>
+          <a:p>
+            <a:r>
+              <a:rPr lang="en-GB" dirty="0"/>
+              <a:t>After modelling approximations, checked that the response with:</a:t>
+            </a:r>
+          </a:p>
+          <a:p>
+            <a:r>
+              <a:rPr lang="en-GB" dirty="0"/>
+              <a:t>Absorber damping of 0 = two split peaks about resonant frequency</a:t>
+            </a:r>
+          </a:p>
+          <a:p>
+            <a:r>
+              <a:rPr lang="en-GB" dirty="0"/>
+              <a:t>Absorber damping high = small </a:t>
+            </a:r>
+            <a:r>
+              <a:rPr lang="en-GB" dirty="0" err="1"/>
+              <a:t>dm</a:t>
+            </a:r>
+            <a:r>
+              <a:rPr lang="en-GB" dirty="0"/>
+              <a:t> to system so slight change in resonant frequency but single peak (effectively 1dof system)</a:t>
+            </a:r>
+          </a:p>
+          <a:p>
+            <a:r>
+              <a:rPr lang="en-GB" dirty="0"/>
+              <a:t>Plot graph of maximum amplitude for each absorber damping to check expected result.</a:t>
+            </a:r>
+          </a:p>
+          <a:p>
+            <a:endParaRPr lang="en-GB" dirty="0"/>
+          </a:p>
+        </p:txBody>
+      </p:sp>
+    </p:spTree>
+    <p:extLst>
+      <p:ext uri="{BB962C8B-B14F-4D97-AF65-F5344CB8AC3E}">
+        <p14:creationId xmlns:p14="http://schemas.microsoft.com/office/powerpoint/2010/main" val="2037780352"/>
       </p:ext>
     </p:extLst>
   </p:cSld>

</xml_diff>

<commit_message>
increased quality of graphs
</commit_message>
<xml_diff>
--- a/Presentation.pptx
+++ b/Presentation.pptx
@@ -3106,7 +3106,7 @@
         <p:spPr>
           <a:xfrm>
             <a:off x="3195108" y="1690688"/>
-            <a:ext cx="5801783" cy="4351338"/>
+            <a:ext cx="5801783" cy="4351337"/>
           </a:xfrm>
         </p:spPr>
       </p:pic>
@@ -3187,7 +3187,7 @@
         <p:spPr>
           <a:xfrm>
             <a:off x="3195108" y="1690688"/>
-            <a:ext cx="5801783" cy="4351338"/>
+            <a:ext cx="5801783" cy="4351337"/>
           </a:xfrm>
         </p:spPr>
       </p:pic>
@@ -3268,7 +3268,7 @@
         <p:spPr>
           <a:xfrm>
             <a:off x="3195108" y="1690688"/>
-            <a:ext cx="5801783" cy="4351337"/>
+            <a:ext cx="5801782" cy="4351337"/>
           </a:xfrm>
         </p:spPr>
       </p:pic>
@@ -3320,10 +3320,9 @@
           <a:lstStyle/>
           <a:p>
             <a:r>
-              <a:rPr lang="en-GB" dirty="0" smtClean="0"/>
+              <a:rPr lang="en-GB" dirty="0"/>
               <a:t>Effect of choice of absorber mass on amplitude at resonance and on optimal damping of absorber.</a:t>
             </a:r>
-            <a:endParaRPr lang="en-GB" dirty="0"/>
           </a:p>
         </p:txBody>
       </p:sp>
@@ -3352,7 +3351,7 @@
         <p:spPr>
           <a:xfrm>
             <a:off x="2867892" y="1823360"/>
-            <a:ext cx="5903087" cy="4427316"/>
+            <a:ext cx="5903087" cy="4427315"/>
           </a:xfrm>
           <a:prstGeom prst="rect">
             <a:avLst/>
@@ -3406,23 +3405,11 @@
           <a:p>
             <a:r>
               <a:rPr lang="en-GB" dirty="0"/>
-              <a:t>Note for absorber of mass = 0.4 this is becoming quite close to the equivalent mass of building (3.3kg) so the results produced may not be reliable as mass of absorber will have </a:t>
-            </a:r>
-            <a:r>
-              <a:rPr lang="en-GB" dirty="0" smtClean="0"/>
-              <a:t>substantial </a:t>
-            </a:r>
-            <a:r>
-              <a:rPr lang="en-GB" dirty="0"/>
-              <a:t>affect </a:t>
+              <a:t>Note for absorber of mass = 0.4 this is becoming quite close to the equivalent mass of building (3.3kg) so the results produced may not be reliable as mass of absorber will have substantial affect </a:t>
             </a:r>
             <a:r>
               <a:rPr lang="en-GB"/>
-              <a:t>on </a:t>
-            </a:r>
-            <a:r>
-              <a:rPr lang="en-GB" smtClean="0"/>
-              <a:t>building</a:t>
+              <a:t>on building</a:t>
             </a:r>
             <a:endParaRPr lang="en-GB" b="1" dirty="0"/>
           </a:p>
@@ -6788,7 +6775,7 @@
         <p:spPr>
           <a:xfrm>
             <a:off x="3195108" y="1690688"/>
-            <a:ext cx="5801783" cy="4351338"/>
+            <a:ext cx="5801783" cy="4351337"/>
           </a:xfrm>
         </p:spPr>
       </p:pic>

</xml_diff>